<commit_message>
Reduce bg image size to improve slide load time
</commit_message>
<xml_diff>
--- a/Keeping Up With C#.pptx
+++ b/Keeping Up With C#.pptx
@@ -21,8 +21,8 @@
     <p:sldId id="324" r:id="rId12"/>
     <p:sldId id="325" r:id="rId13"/>
     <p:sldId id="326" r:id="rId14"/>
-    <p:sldId id="302" r:id="rId15"/>
-    <p:sldId id="315" r:id="rId16"/>
+    <p:sldId id="328" r:id="rId15"/>
+    <p:sldId id="327" r:id="rId16"/>
     <p:sldId id="304" r:id="rId17"/>
   </p:sldIdLst>
   <p:sldSz cx="12192000" cy="6858000"/>
@@ -1119,7 +1119,7 @@
     </p:spTree>
     <p:extLst>
       <p:ext uri="{BB962C8B-B14F-4D97-AF65-F5344CB8AC3E}">
-        <p14:creationId xmlns:p14="http://schemas.microsoft.com/office/powerpoint/2010/main" val="777464679"/>
+        <p14:creationId xmlns:p14="http://schemas.microsoft.com/office/powerpoint/2010/main" val="2760286020"/>
       </p:ext>
     </p:extLst>
   </p:cSld>
@@ -1203,7 +1203,7 @@
     </p:spTree>
     <p:extLst>
       <p:ext uri="{BB962C8B-B14F-4D97-AF65-F5344CB8AC3E}">
-        <p14:creationId xmlns:p14="http://schemas.microsoft.com/office/powerpoint/2010/main" val="1017054379"/>
+        <p14:creationId xmlns:p14="http://schemas.microsoft.com/office/powerpoint/2010/main" val="273908282"/>
       </p:ext>
     </p:extLst>
   </p:cSld>
@@ -14535,10 +14535,10 @@
       </p:grpSpPr>
       <p:pic>
         <p:nvPicPr>
-          <p:cNvPr id="13" name="Picture 12" descr="A picture containing electronics, display&#10;&#10;Description automatically generated">
+          <p:cNvPr id="3" name="Picture 2" descr="A picture containing electronics&#10;&#10;Description automatically generated">
             <a:extLst>
               <a:ext uri="{FF2B5EF4-FFF2-40B4-BE49-F238E27FC236}">
-                <a16:creationId xmlns:a16="http://schemas.microsoft.com/office/drawing/2014/main" id="{88349F9C-2412-0E43-AFFE-C530518CC76D}"/>
+                <a16:creationId xmlns:a16="http://schemas.microsoft.com/office/drawing/2014/main" id="{F81485D8-0FEC-482A-ABDF-D27D45552396}"/>
               </a:ext>
             </a:extLst>
           </p:cNvPr>
@@ -14555,8 +14555,286 @@
         </p:blipFill>
         <p:spPr>
           <a:xfrm>
-            <a:off x="904661" y="315686"/>
-            <a:ext cx="10382679" cy="6629400"/>
+            <a:off x="901758" y="274287"/>
+            <a:ext cx="10388484" cy="6626926"/>
+          </a:xfrm>
+          <a:prstGeom prst="rect">
+            <a:avLst/>
+          </a:prstGeom>
+        </p:spPr>
+      </p:pic>
+      <p:sp>
+        <p:nvSpPr>
+          <p:cNvPr id="9" name="TextBox 8">
+            <a:extLst>
+              <a:ext uri="{FF2B5EF4-FFF2-40B4-BE49-F238E27FC236}">
+                <a16:creationId xmlns:a16="http://schemas.microsoft.com/office/drawing/2014/main" id="{000DE3CD-9233-DC4E-BBCE-A8DE86739D16}"/>
+              </a:ext>
+            </a:extLst>
+          </p:cNvPr>
+          <p:cNvSpPr txBox="1"/>
+          <p:nvPr/>
+        </p:nvSpPr>
+        <p:spPr>
+          <a:xfrm>
+            <a:off x="1385016" y="1940092"/>
+            <a:ext cx="9421968" cy="2941767"/>
+          </a:xfrm>
+          <a:prstGeom prst="rect">
+            <a:avLst/>
+          </a:prstGeom>
+          <a:noFill/>
+        </p:spPr>
+        <p:txBody>
+          <a:bodyPr wrap="square" rtlCol="0">
+            <a:spAutoFit/>
+          </a:bodyPr>
+          <a:lstStyle/>
+          <a:p>
+            <a:pPr marL="342900" indent="-342900">
+              <a:lnSpc>
+                <a:spcPct val="200000"/>
+              </a:lnSpc>
+              <a:buFont typeface="Arial" panose="020B0604020202020204" pitchFamily="34" charset="0"/>
+              <a:buChar char="•"/>
+            </a:pPr>
+            <a:r>
+              <a:rPr lang="en-US" sz="2400" dirty="0">
+                <a:solidFill>
+                  <a:schemeClr val="bg1"/>
+                </a:solidFill>
+                <a:ea typeface="+mn-lt"/>
+                <a:cs typeface="+mn-lt"/>
+                <a:hlinkClick r:id="rId4">
+                  <a:extLst>
+                    <a:ext uri="{A12FA001-AC4F-418D-AE19-62706E023703}">
+                      <ahyp:hlinkClr xmlns:ahyp="http://schemas.microsoft.com/office/drawing/2018/hyperlinkcolor" val="tx"/>
+                    </a:ext>
+                  </a:extLst>
+                </a:hlinkClick>
+              </a:rPr>
+              <a:t>https://dot.net</a:t>
+            </a:r>
+          </a:p>
+          <a:p>
+            <a:pPr marL="342900" indent="-342900">
+              <a:lnSpc>
+                <a:spcPct val="200000"/>
+              </a:lnSpc>
+              <a:buFont typeface="Arial" panose="020B0604020202020204" pitchFamily="34" charset="0"/>
+              <a:buChar char="•"/>
+            </a:pPr>
+            <a:r>
+              <a:rPr lang="en-US" sz="2400" dirty="0">
+                <a:solidFill>
+                  <a:schemeClr val="bg1"/>
+                </a:solidFill>
+                <a:ea typeface="+mn-lt"/>
+                <a:cs typeface="+mn-lt"/>
+                <a:hlinkClick r:id="rId4">
+                  <a:extLst>
+                    <a:ext uri="{A12FA001-AC4F-418D-AE19-62706E023703}">
+                      <ahyp:hlinkClr xmlns:ahyp="http://schemas.microsoft.com/office/drawing/2018/hyperlinkcolor" val="tx"/>
+                    </a:ext>
+                  </a:extLst>
+                </a:hlinkClick>
+              </a:rPr>
+              <a:t>https://docs.microsoft.com/en-us/dotnet/csharp/whats-new/csharp-8</a:t>
+            </a:r>
+            <a:endParaRPr lang="en-US" sz="2400" dirty="0">
+              <a:solidFill>
+                <a:schemeClr val="bg1"/>
+              </a:solidFill>
+              <a:ea typeface="+mn-lt"/>
+              <a:cs typeface="+mn-lt"/>
+            </a:endParaRPr>
+          </a:p>
+          <a:p>
+            <a:pPr marL="342900" indent="-342900">
+              <a:lnSpc>
+                <a:spcPct val="200000"/>
+              </a:lnSpc>
+              <a:buFont typeface="Arial" panose="020B0604020202020204" pitchFamily="34" charset="0"/>
+              <a:buChar char="•"/>
+            </a:pPr>
+            <a:r>
+              <a:rPr lang="en-US" sz="2400" dirty="0">
+                <a:solidFill>
+                  <a:schemeClr val="bg1"/>
+                </a:solidFill>
+                <a:ea typeface="+mn-lt"/>
+                <a:cs typeface="+mn-lt"/>
+                <a:hlinkClick r:id="rId5">
+                  <a:extLst>
+                    <a:ext uri="{A12FA001-AC4F-418D-AE19-62706E023703}">
+                      <ahyp:hlinkClr xmlns:ahyp="http://schemas.microsoft.com/office/drawing/2018/hyperlinkcolor" val="tx"/>
+                    </a:ext>
+                  </a:extLst>
+                </a:hlinkClick>
+              </a:rPr>
+              <a:t>https://github.com/dotnet/csharplang</a:t>
+            </a:r>
+          </a:p>
+          <a:p>
+            <a:pPr marL="342900" indent="-342900">
+              <a:lnSpc>
+                <a:spcPct val="200000"/>
+              </a:lnSpc>
+              <a:buFont typeface="Arial" panose="020B0604020202020204" pitchFamily="34" charset="0"/>
+              <a:buChar char="•"/>
+            </a:pPr>
+            <a:r>
+              <a:rPr lang="en-US" sz="2400" dirty="0">
+                <a:solidFill>
+                  <a:schemeClr val="bg1"/>
+                </a:solidFill>
+                <a:ea typeface="+mn-lt"/>
+                <a:cs typeface="+mn-lt"/>
+                <a:hlinkClick r:id="rId6">
+                  <a:extLst>
+                    <a:ext uri="{A12FA001-AC4F-418D-AE19-62706E023703}">
+                      <ahyp:hlinkClr xmlns:ahyp="http://schemas.microsoft.com/office/drawing/2018/hyperlinkcolor" val="tx"/>
+                    </a:ext>
+                  </a:extLst>
+                </a:hlinkClick>
+              </a:rPr>
+              <a:t>https://devblogs.microsoft.com/dotnet/category/c/</a:t>
+            </a:r>
+            <a:endParaRPr lang="en-US" sz="2400" dirty="0">
+              <a:solidFill>
+                <a:schemeClr val="bg1"/>
+              </a:solidFill>
+              <a:latin typeface="Rocket Sans" panose="020B0602020202020204" pitchFamily="34" charset="0"/>
+              <a:ea typeface="Rocket Sans" panose="020B0602020202020204" pitchFamily="34" charset="0"/>
+            </a:endParaRPr>
+          </a:p>
+        </p:txBody>
+      </p:sp>
+      <p:sp>
+        <p:nvSpPr>
+          <p:cNvPr id="11" name="TextBox 10">
+            <a:extLst>
+              <a:ext uri="{FF2B5EF4-FFF2-40B4-BE49-F238E27FC236}">
+                <a16:creationId xmlns:a16="http://schemas.microsoft.com/office/drawing/2014/main" id="{2D6D5E08-A9D5-A241-89B0-DE7095C78C45}"/>
+              </a:ext>
+            </a:extLst>
+          </p:cNvPr>
+          <p:cNvSpPr txBox="1"/>
+          <p:nvPr/>
+        </p:nvSpPr>
+        <p:spPr>
+          <a:xfrm>
+            <a:off x="1542500" y="778217"/>
+            <a:ext cx="7451598" cy="1323439"/>
+          </a:xfrm>
+          <a:prstGeom prst="rect">
+            <a:avLst/>
+          </a:prstGeom>
+          <a:noFill/>
+        </p:spPr>
+        <p:txBody>
+          <a:bodyPr wrap="square" rtlCol="0">
+            <a:spAutoFit/>
+          </a:bodyPr>
+          <a:lstStyle/>
+          <a:p>
+            <a:r>
+              <a:rPr lang="en-US" sz="8000" b="1">
+                <a:solidFill>
+                  <a:schemeClr val="bg1"/>
+                </a:solidFill>
+                <a:latin typeface="Rocket Sans" panose="020B0602020202020204" pitchFamily="34" charset="0"/>
+                <a:ea typeface="Rocket Sans" panose="020B0602020202020204" pitchFamily="34" charset="0"/>
+              </a:rPr>
+              <a:t>keep up here:</a:t>
+            </a:r>
+          </a:p>
+        </p:txBody>
+      </p:sp>
+      <p:pic>
+        <p:nvPicPr>
+          <p:cNvPr id="19" name="Picture 18" descr="A close up of a logo&#10;&#10;Description automatically generated">
+            <a:extLst>
+              <a:ext uri="{FF2B5EF4-FFF2-40B4-BE49-F238E27FC236}">
+                <a16:creationId xmlns:a16="http://schemas.microsoft.com/office/drawing/2014/main" id="{2AFACB4C-A4AC-4847-96F0-5DF625436670}"/>
+              </a:ext>
+            </a:extLst>
+          </p:cNvPr>
+          <p:cNvPicPr>
+            <a:picLocks noChangeAspect="1"/>
+          </p:cNvPicPr>
+          <p:nvPr/>
+        </p:nvPicPr>
+        <p:blipFill>
+          <a:blip r:embed="rId7"/>
+          <a:stretch>
+            <a:fillRect/>
+          </a:stretch>
+        </p:blipFill>
+        <p:spPr>
+          <a:xfrm>
+            <a:off x="10473128" y="5279612"/>
+            <a:ext cx="491339" cy="477712"/>
+          </a:xfrm>
+          <a:prstGeom prst="rect">
+            <a:avLst/>
+          </a:prstGeom>
+        </p:spPr>
+      </p:pic>
+    </p:spTree>
+    <p:extLst>
+      <p:ext uri="{BB962C8B-B14F-4D97-AF65-F5344CB8AC3E}">
+        <p14:creationId xmlns:p14="http://schemas.microsoft.com/office/powerpoint/2010/main" val="3126867027"/>
+      </p:ext>
+    </p:extLst>
+  </p:cSld>
+  <p:clrMapOvr>
+    <a:masterClrMapping/>
+  </p:clrMapOvr>
+</p:sld>
+</file>
+
+<file path=ppt/slides/slide15.xml><?xml version="1.0" encoding="utf-8"?>
+<p:sld xmlns:a="http://schemas.openxmlformats.org/drawingml/2006/main" xmlns:r="http://schemas.openxmlformats.org/officeDocument/2006/relationships" xmlns:p="http://schemas.openxmlformats.org/presentationml/2006/main">
+  <p:cSld>
+    <p:spTree>
+      <p:nvGrpSpPr>
+        <p:cNvPr id="1" name=""/>
+        <p:cNvGrpSpPr/>
+        <p:nvPr/>
+      </p:nvGrpSpPr>
+      <p:grpSpPr>
+        <a:xfrm>
+          <a:off x="0" y="0"/>
+          <a:ext cx="0" cy="0"/>
+          <a:chOff x="0" y="0"/>
+          <a:chExt cx="0" cy="0"/>
+        </a:xfrm>
+      </p:grpSpPr>
+      <p:pic>
+        <p:nvPicPr>
+          <p:cNvPr id="7" name="Picture 6" descr="A picture containing electronics&#10;&#10;Description automatically generated">
+            <a:extLst>
+              <a:ext uri="{FF2B5EF4-FFF2-40B4-BE49-F238E27FC236}">
+                <a16:creationId xmlns:a16="http://schemas.microsoft.com/office/drawing/2014/main" id="{7F6A7F04-8694-4BA7-B869-E74522972B23}"/>
+              </a:ext>
+            </a:extLst>
+          </p:cNvPr>
+          <p:cNvPicPr>
+            <a:picLocks noChangeAspect="1"/>
+          </p:cNvPicPr>
+          <p:nvPr/>
+        </p:nvPicPr>
+        <p:blipFill>
+          <a:blip r:embed="rId3"/>
+          <a:stretch>
+            <a:fillRect/>
+          </a:stretch>
+        </p:blipFill>
+        <p:spPr>
+          <a:xfrm>
+            <a:off x="901758" y="274287"/>
+            <a:ext cx="10388484" cy="6626926"/>
           </a:xfrm>
           <a:prstGeom prst="rect">
             <a:avLst/>
@@ -14959,285 +15237,7 @@
     </p:spTree>
     <p:extLst>
       <p:ext uri="{BB962C8B-B14F-4D97-AF65-F5344CB8AC3E}">
-        <p14:creationId xmlns:p14="http://schemas.microsoft.com/office/powerpoint/2010/main" val="752404881"/>
-      </p:ext>
-    </p:extLst>
-  </p:cSld>
-  <p:clrMapOvr>
-    <a:masterClrMapping/>
-  </p:clrMapOvr>
-</p:sld>
-</file>
-
-<file path=ppt/slides/slide15.xml><?xml version="1.0" encoding="utf-8"?>
-<p:sld xmlns:a="http://schemas.openxmlformats.org/drawingml/2006/main" xmlns:r="http://schemas.openxmlformats.org/officeDocument/2006/relationships" xmlns:p="http://schemas.openxmlformats.org/presentationml/2006/main">
-  <p:cSld>
-    <p:spTree>
-      <p:nvGrpSpPr>
-        <p:cNvPr id="1" name=""/>
-        <p:cNvGrpSpPr/>
-        <p:nvPr/>
-      </p:nvGrpSpPr>
-      <p:grpSpPr>
-        <a:xfrm>
-          <a:off x="0" y="0"/>
-          <a:ext cx="0" cy="0"/>
-          <a:chOff x="0" y="0"/>
-          <a:chExt cx="0" cy="0"/>
-        </a:xfrm>
-      </p:grpSpPr>
-      <p:pic>
-        <p:nvPicPr>
-          <p:cNvPr id="13" name="Picture 12" descr="A picture containing electronics, display&#10;&#10;Description automatically generated">
-            <a:extLst>
-              <a:ext uri="{FF2B5EF4-FFF2-40B4-BE49-F238E27FC236}">
-                <a16:creationId xmlns:a16="http://schemas.microsoft.com/office/drawing/2014/main" id="{88349F9C-2412-0E43-AFFE-C530518CC76D}"/>
-              </a:ext>
-            </a:extLst>
-          </p:cNvPr>
-          <p:cNvPicPr>
-            <a:picLocks noChangeAspect="1"/>
-          </p:cNvPicPr>
-          <p:nvPr/>
-        </p:nvPicPr>
-        <p:blipFill>
-          <a:blip r:embed="rId3"/>
-          <a:stretch>
-            <a:fillRect/>
-          </a:stretch>
-        </p:blipFill>
-        <p:spPr>
-          <a:xfrm>
-            <a:off x="904661" y="315686"/>
-            <a:ext cx="10382679" cy="6629400"/>
-          </a:xfrm>
-          <a:prstGeom prst="rect">
-            <a:avLst/>
-          </a:prstGeom>
-        </p:spPr>
-      </p:pic>
-      <p:sp>
-        <p:nvSpPr>
-          <p:cNvPr id="9" name="TextBox 8">
-            <a:extLst>
-              <a:ext uri="{FF2B5EF4-FFF2-40B4-BE49-F238E27FC236}">
-                <a16:creationId xmlns:a16="http://schemas.microsoft.com/office/drawing/2014/main" id="{000DE3CD-9233-DC4E-BBCE-A8DE86739D16}"/>
-              </a:ext>
-            </a:extLst>
-          </p:cNvPr>
-          <p:cNvSpPr txBox="1"/>
-          <p:nvPr/>
-        </p:nvSpPr>
-        <p:spPr>
-          <a:xfrm>
-            <a:off x="1385016" y="1940092"/>
-            <a:ext cx="9421968" cy="2941767"/>
-          </a:xfrm>
-          <a:prstGeom prst="rect">
-            <a:avLst/>
-          </a:prstGeom>
-          <a:noFill/>
-        </p:spPr>
-        <p:txBody>
-          <a:bodyPr wrap="square" rtlCol="0">
-            <a:spAutoFit/>
-          </a:bodyPr>
-          <a:lstStyle/>
-          <a:p>
-            <a:pPr marL="342900" indent="-342900">
-              <a:lnSpc>
-                <a:spcPct val="200000"/>
-              </a:lnSpc>
-              <a:buFont typeface="Arial" panose="020B0604020202020204" pitchFamily="34" charset="0"/>
-              <a:buChar char="•"/>
-            </a:pPr>
-            <a:r>
-              <a:rPr lang="en-US" sz="2400" dirty="0">
-                <a:solidFill>
-                  <a:schemeClr val="bg1"/>
-                </a:solidFill>
-                <a:ea typeface="+mn-lt"/>
-                <a:cs typeface="+mn-lt"/>
-                <a:hlinkClick r:id="rId4">
-                  <a:extLst>
-                    <a:ext uri="{A12FA001-AC4F-418D-AE19-62706E023703}">
-                      <ahyp:hlinkClr xmlns:ahyp="http://schemas.microsoft.com/office/drawing/2018/hyperlinkcolor" val="tx"/>
-                    </a:ext>
-                  </a:extLst>
-                </a:hlinkClick>
-              </a:rPr>
-              <a:t>https://dot.net</a:t>
-            </a:r>
-          </a:p>
-          <a:p>
-            <a:pPr marL="342900" indent="-342900">
-              <a:lnSpc>
-                <a:spcPct val="200000"/>
-              </a:lnSpc>
-              <a:buFont typeface="Arial" panose="020B0604020202020204" pitchFamily="34" charset="0"/>
-              <a:buChar char="•"/>
-            </a:pPr>
-            <a:r>
-              <a:rPr lang="en-US" sz="2400" dirty="0">
-                <a:solidFill>
-                  <a:schemeClr val="bg1"/>
-                </a:solidFill>
-                <a:ea typeface="+mn-lt"/>
-                <a:cs typeface="+mn-lt"/>
-                <a:hlinkClick r:id="rId4">
-                  <a:extLst>
-                    <a:ext uri="{A12FA001-AC4F-418D-AE19-62706E023703}">
-                      <ahyp:hlinkClr xmlns:ahyp="http://schemas.microsoft.com/office/drawing/2018/hyperlinkcolor" val="tx"/>
-                    </a:ext>
-                  </a:extLst>
-                </a:hlinkClick>
-              </a:rPr>
-              <a:t>https://docs.microsoft.com/en-us/dotnet/csharp/whats-new/csharp-8</a:t>
-            </a:r>
-            <a:endParaRPr lang="en-US" sz="2400" dirty="0">
-              <a:solidFill>
-                <a:schemeClr val="bg1"/>
-              </a:solidFill>
-              <a:ea typeface="+mn-lt"/>
-              <a:cs typeface="+mn-lt"/>
-            </a:endParaRPr>
-          </a:p>
-          <a:p>
-            <a:pPr marL="342900" indent="-342900">
-              <a:lnSpc>
-                <a:spcPct val="200000"/>
-              </a:lnSpc>
-              <a:buFont typeface="Arial" panose="020B0604020202020204" pitchFamily="34" charset="0"/>
-              <a:buChar char="•"/>
-            </a:pPr>
-            <a:r>
-              <a:rPr lang="en-US" sz="2400" dirty="0">
-                <a:solidFill>
-                  <a:schemeClr val="bg1"/>
-                </a:solidFill>
-                <a:ea typeface="+mn-lt"/>
-                <a:cs typeface="+mn-lt"/>
-                <a:hlinkClick r:id="rId5">
-                  <a:extLst>
-                    <a:ext uri="{A12FA001-AC4F-418D-AE19-62706E023703}">
-                      <ahyp:hlinkClr xmlns:ahyp="http://schemas.microsoft.com/office/drawing/2018/hyperlinkcolor" val="tx"/>
-                    </a:ext>
-                  </a:extLst>
-                </a:hlinkClick>
-              </a:rPr>
-              <a:t>https://github.com/dotnet/csharplang</a:t>
-            </a:r>
-          </a:p>
-          <a:p>
-            <a:pPr marL="342900" indent="-342900">
-              <a:lnSpc>
-                <a:spcPct val="200000"/>
-              </a:lnSpc>
-              <a:buFont typeface="Arial" panose="020B0604020202020204" pitchFamily="34" charset="0"/>
-              <a:buChar char="•"/>
-            </a:pPr>
-            <a:r>
-              <a:rPr lang="en-US" sz="2400" dirty="0">
-                <a:solidFill>
-                  <a:schemeClr val="bg1"/>
-                </a:solidFill>
-                <a:ea typeface="+mn-lt"/>
-                <a:cs typeface="+mn-lt"/>
-                <a:hlinkClick r:id="rId6">
-                  <a:extLst>
-                    <a:ext uri="{A12FA001-AC4F-418D-AE19-62706E023703}">
-                      <ahyp:hlinkClr xmlns:ahyp="http://schemas.microsoft.com/office/drawing/2018/hyperlinkcolor" val="tx"/>
-                    </a:ext>
-                  </a:extLst>
-                </a:hlinkClick>
-              </a:rPr>
-              <a:t>https://devblogs.microsoft.com/dotnet/category/c/</a:t>
-            </a:r>
-            <a:endParaRPr lang="en-US" sz="2400" dirty="0">
-              <a:solidFill>
-                <a:schemeClr val="bg1"/>
-              </a:solidFill>
-              <a:latin typeface="Rocket Sans" panose="020B0602020202020204" pitchFamily="34" charset="0"/>
-              <a:ea typeface="Rocket Sans" panose="020B0602020202020204" pitchFamily="34" charset="0"/>
-            </a:endParaRPr>
-          </a:p>
-        </p:txBody>
-      </p:sp>
-      <p:sp>
-        <p:nvSpPr>
-          <p:cNvPr id="11" name="TextBox 10">
-            <a:extLst>
-              <a:ext uri="{FF2B5EF4-FFF2-40B4-BE49-F238E27FC236}">
-                <a16:creationId xmlns:a16="http://schemas.microsoft.com/office/drawing/2014/main" id="{2D6D5E08-A9D5-A241-89B0-DE7095C78C45}"/>
-              </a:ext>
-            </a:extLst>
-          </p:cNvPr>
-          <p:cNvSpPr txBox="1"/>
-          <p:nvPr/>
-        </p:nvSpPr>
-        <p:spPr>
-          <a:xfrm>
-            <a:off x="1542500" y="778217"/>
-            <a:ext cx="7451598" cy="1323439"/>
-          </a:xfrm>
-          <a:prstGeom prst="rect">
-            <a:avLst/>
-          </a:prstGeom>
-          <a:noFill/>
-        </p:spPr>
-        <p:txBody>
-          <a:bodyPr wrap="square" rtlCol="0">
-            <a:spAutoFit/>
-          </a:bodyPr>
-          <a:lstStyle/>
-          <a:p>
-            <a:r>
-              <a:rPr lang="en-US" sz="8000" b="1">
-                <a:solidFill>
-                  <a:schemeClr val="bg1"/>
-                </a:solidFill>
-                <a:latin typeface="Rocket Sans" panose="020B0602020202020204" pitchFamily="34" charset="0"/>
-                <a:ea typeface="Rocket Sans" panose="020B0602020202020204" pitchFamily="34" charset="0"/>
-              </a:rPr>
-              <a:t>keep up here:</a:t>
-            </a:r>
-          </a:p>
-        </p:txBody>
-      </p:sp>
-      <p:pic>
-        <p:nvPicPr>
-          <p:cNvPr id="19" name="Picture 18" descr="A close up of a logo&#10;&#10;Description automatically generated">
-            <a:extLst>
-              <a:ext uri="{FF2B5EF4-FFF2-40B4-BE49-F238E27FC236}">
-                <a16:creationId xmlns:a16="http://schemas.microsoft.com/office/drawing/2014/main" id="{2AFACB4C-A4AC-4847-96F0-5DF625436670}"/>
-              </a:ext>
-            </a:extLst>
-          </p:cNvPr>
-          <p:cNvPicPr>
-            <a:picLocks noChangeAspect="1"/>
-          </p:cNvPicPr>
-          <p:nvPr/>
-        </p:nvPicPr>
-        <p:blipFill>
-          <a:blip r:embed="rId7"/>
-          <a:stretch>
-            <a:fillRect/>
-          </a:stretch>
-        </p:blipFill>
-        <p:spPr>
-          <a:xfrm>
-            <a:off x="10473128" y="5279612"/>
-            <a:ext cx="491339" cy="477712"/>
-          </a:xfrm>
-          <a:prstGeom prst="rect">
-            <a:avLst/>
-          </a:prstGeom>
-        </p:spPr>
-      </p:pic>
-    </p:spTree>
-    <p:extLst>
-      <p:ext uri="{BB962C8B-B14F-4D97-AF65-F5344CB8AC3E}">
-        <p14:creationId xmlns:p14="http://schemas.microsoft.com/office/powerpoint/2010/main" val="1421089506"/>
+        <p14:creationId xmlns:p14="http://schemas.microsoft.com/office/powerpoint/2010/main" val="1929157471"/>
       </p:ext>
     </p:extLst>
   </p:cSld>

</xml_diff>